<commit_message>
lick xong sua con xoa nua la xong/ them FormBoMon
</commit_message>
<xml_diff>
--- a/Nhom7-C#.pptx
+++ b/Nhom7-C#.pptx
@@ -114,6 +114,11 @@
       </a:defRPr>
     </a:lvl9pPr>
   </p:defaultTextStyle>
+  <p:extLst>
+    <p:ext uri="{EFAFB233-063F-42B5-8137-9DF3F51BA10A}">
+      <p15:sldGuideLst xmlns:p15="http://schemas.microsoft.com/office/powerpoint/2012/main"/>
+    </p:ext>
+  </p:extLst>
 </p:presentation>
 </file>
 
@@ -264,7 +269,7 @@
           <a:p>
             <a:fld id="{BA3438C7-8BCB-4545-86C5-A7698B055019}" type="datetimeFigureOut">
               <a:rPr lang="en-US" smtClean="0"/>
-              <a:t>11/26/2022</a:t>
+              <a:t>11/27/2022</a:t>
             </a:fld>
             <a:endParaRPr lang="en-US"/>
           </a:p>
@@ -462,7 +467,7 @@
           <a:p>
             <a:fld id="{BA3438C7-8BCB-4545-86C5-A7698B055019}" type="datetimeFigureOut">
               <a:rPr lang="en-US" smtClean="0"/>
-              <a:t>11/26/2022</a:t>
+              <a:t>11/27/2022</a:t>
             </a:fld>
             <a:endParaRPr lang="en-US"/>
           </a:p>
@@ -670,7 +675,7 @@
           <a:p>
             <a:fld id="{BA3438C7-8BCB-4545-86C5-A7698B055019}" type="datetimeFigureOut">
               <a:rPr lang="en-US" smtClean="0"/>
-              <a:t>11/26/2022</a:t>
+              <a:t>11/27/2022</a:t>
             </a:fld>
             <a:endParaRPr lang="en-US"/>
           </a:p>
@@ -868,7 +873,7 @@
           <a:p>
             <a:fld id="{BA3438C7-8BCB-4545-86C5-A7698B055019}" type="datetimeFigureOut">
               <a:rPr lang="en-US" smtClean="0"/>
-              <a:t>11/26/2022</a:t>
+              <a:t>11/27/2022</a:t>
             </a:fld>
             <a:endParaRPr lang="en-US"/>
           </a:p>
@@ -1143,7 +1148,7 @@
           <a:p>
             <a:fld id="{BA3438C7-8BCB-4545-86C5-A7698B055019}" type="datetimeFigureOut">
               <a:rPr lang="en-US" smtClean="0"/>
-              <a:t>11/26/2022</a:t>
+              <a:t>11/27/2022</a:t>
             </a:fld>
             <a:endParaRPr lang="en-US"/>
           </a:p>
@@ -1408,7 +1413,7 @@
           <a:p>
             <a:fld id="{BA3438C7-8BCB-4545-86C5-A7698B055019}" type="datetimeFigureOut">
               <a:rPr lang="en-US" smtClean="0"/>
-              <a:t>11/26/2022</a:t>
+              <a:t>11/27/2022</a:t>
             </a:fld>
             <a:endParaRPr lang="en-US"/>
           </a:p>
@@ -1820,7 +1825,7 @@
           <a:p>
             <a:fld id="{BA3438C7-8BCB-4545-86C5-A7698B055019}" type="datetimeFigureOut">
               <a:rPr lang="en-US" smtClean="0"/>
-              <a:t>11/26/2022</a:t>
+              <a:t>11/27/2022</a:t>
             </a:fld>
             <a:endParaRPr lang="en-US"/>
           </a:p>
@@ -1961,7 +1966,7 @@
           <a:p>
             <a:fld id="{BA3438C7-8BCB-4545-86C5-A7698B055019}" type="datetimeFigureOut">
               <a:rPr lang="en-US" smtClean="0"/>
-              <a:t>11/26/2022</a:t>
+              <a:t>11/27/2022</a:t>
             </a:fld>
             <a:endParaRPr lang="en-US"/>
           </a:p>
@@ -2074,7 +2079,7 @@
           <a:p>
             <a:fld id="{BA3438C7-8BCB-4545-86C5-A7698B055019}" type="datetimeFigureOut">
               <a:rPr lang="en-US" smtClean="0"/>
-              <a:t>11/26/2022</a:t>
+              <a:t>11/27/2022</a:t>
             </a:fld>
             <a:endParaRPr lang="en-US"/>
           </a:p>
@@ -2385,7 +2390,7 @@
           <a:p>
             <a:fld id="{BA3438C7-8BCB-4545-86C5-A7698B055019}" type="datetimeFigureOut">
               <a:rPr lang="en-US" smtClean="0"/>
-              <a:t>11/26/2022</a:t>
+              <a:t>11/27/2022</a:t>
             </a:fld>
             <a:endParaRPr lang="en-US"/>
           </a:p>
@@ -2673,7 +2678,7 @@
           <a:p>
             <a:fld id="{BA3438C7-8BCB-4545-86C5-A7698B055019}" type="datetimeFigureOut">
               <a:rPr lang="en-US" smtClean="0"/>
-              <a:t>11/26/2022</a:t>
+              <a:t>11/27/2022</a:t>
             </a:fld>
             <a:endParaRPr lang="en-US"/>
           </a:p>
@@ -2914,7 +2919,7 @@
           <a:p>
             <a:fld id="{BA3438C7-8BCB-4545-86C5-A7698B055019}" type="datetimeFigureOut">
               <a:rPr lang="en-US" smtClean="0"/>
-              <a:t>11/26/2022</a:t>
+              <a:t>11/27/2022</a:t>
             </a:fld>
             <a:endParaRPr lang="en-US"/>
           </a:p>
@@ -5290,13 +5295,13 @@
   <p:clrMapOvr>
     <a:masterClrMapping/>
   </p:clrMapOvr>
-  <mc:AlternateContent xmlns:mc="http://schemas.openxmlformats.org/markup-compatibility/2006">
-    <mc:Choice xmlns:p159="http://schemas.microsoft.com/office/powerpoint/2015/09/main" Requires="p159">
+  <mc:AlternateContent xmlns:mc="http://schemas.openxmlformats.org/markup-compatibility/2006" xmlns:p159="http://schemas.microsoft.com/office/powerpoint/2015/09/main">
+    <mc:Choice Requires="p159">
       <p:transition xmlns:p14="http://schemas.microsoft.com/office/powerpoint/2010/main" spd="slow" p14:dur="2000">
         <p159:morph option="byObject"/>
       </p:transition>
     </mc:Choice>
-    <mc:Fallback>
+    <mc:Fallback xmlns="">
       <p:transition spd="slow">
         <p:fade/>
       </p:transition>
@@ -6390,13 +6395,13 @@
   <p:clrMapOvr>
     <a:masterClrMapping/>
   </p:clrMapOvr>
-  <mc:AlternateContent xmlns:mc="http://schemas.openxmlformats.org/markup-compatibility/2006">
-    <mc:Choice xmlns:p159="http://schemas.microsoft.com/office/powerpoint/2015/09/main" Requires="p159">
+  <mc:AlternateContent xmlns:mc="http://schemas.openxmlformats.org/markup-compatibility/2006" xmlns:p159="http://schemas.microsoft.com/office/powerpoint/2015/09/main">
+    <mc:Choice Requires="p159">
       <p:transition xmlns:p14="http://schemas.microsoft.com/office/powerpoint/2010/main" spd="slow" p14:dur="2000">
         <p159:morph option="byObject"/>
       </p:transition>
     </mc:Choice>
-    <mc:Fallback>
+    <mc:Fallback xmlns="">
       <p:transition spd="slow">
         <p:fade/>
       </p:transition>
@@ -7024,13 +7029,13 @@
   <p:clrMapOvr>
     <a:masterClrMapping/>
   </p:clrMapOvr>
-  <mc:AlternateContent xmlns:mc="http://schemas.openxmlformats.org/markup-compatibility/2006">
-    <mc:Choice xmlns:p14="http://schemas.microsoft.com/office/powerpoint/2010/main" Requires="p14">
+  <mc:AlternateContent xmlns:mc="http://schemas.openxmlformats.org/markup-compatibility/2006" xmlns:p14="http://schemas.microsoft.com/office/powerpoint/2010/main">
+    <mc:Choice Requires="p14">
       <p:transition spd="med" p14:dur="700">
         <p:fade/>
       </p:transition>
     </mc:Choice>
-    <mc:Fallback>
+    <mc:Fallback xmlns="">
       <p:transition spd="med">
         <p:fade/>
       </p:transition>
@@ -12325,13 +12330,13 @@
   <p:clrMapOvr>
     <a:masterClrMapping/>
   </p:clrMapOvr>
-  <mc:AlternateContent xmlns:mc="http://schemas.openxmlformats.org/markup-compatibility/2006">
-    <mc:Choice xmlns:p159="http://schemas.microsoft.com/office/powerpoint/2015/09/main" Requires="p159">
+  <mc:AlternateContent xmlns:mc="http://schemas.openxmlformats.org/markup-compatibility/2006" xmlns:p159="http://schemas.microsoft.com/office/powerpoint/2015/09/main">
+    <mc:Choice Requires="p159">
       <p:transition xmlns:p14="http://schemas.microsoft.com/office/powerpoint/2010/main" spd="slow" p14:dur="2000">
         <p159:morph option="byObject"/>
       </p:transition>
     </mc:Choice>
-    <mc:Fallback>
+    <mc:Fallback xmlns="">
       <p:transition spd="slow">
         <p:fade/>
       </p:transition>
@@ -14332,13 +14337,13 @@
   <p:clrMapOvr>
     <a:masterClrMapping/>
   </p:clrMapOvr>
-  <mc:AlternateContent xmlns:mc="http://schemas.openxmlformats.org/markup-compatibility/2006">
-    <mc:Choice xmlns:p159="http://schemas.microsoft.com/office/powerpoint/2015/09/main" Requires="p159">
+  <mc:AlternateContent xmlns:mc="http://schemas.openxmlformats.org/markup-compatibility/2006" xmlns:p159="http://schemas.microsoft.com/office/powerpoint/2015/09/main">
+    <mc:Choice Requires="p159">
       <p:transition xmlns:p14="http://schemas.microsoft.com/office/powerpoint/2010/main" spd="slow" p14:dur="2000">
         <p159:morph option="byObject"/>
       </p:transition>
     </mc:Choice>
-    <mc:Fallback>
+    <mc:Fallback xmlns="">
       <p:transition spd="slow">
         <p:fade/>
       </p:transition>
@@ -17709,13 +17714,13 @@
   <p:clrMapOvr>
     <a:masterClrMapping/>
   </p:clrMapOvr>
-  <mc:AlternateContent xmlns:mc="http://schemas.openxmlformats.org/markup-compatibility/2006">
-    <mc:Choice xmlns:p159="http://schemas.microsoft.com/office/powerpoint/2015/09/main" Requires="p159">
+  <mc:AlternateContent xmlns:mc="http://schemas.openxmlformats.org/markup-compatibility/2006" xmlns:p159="http://schemas.microsoft.com/office/powerpoint/2015/09/main">
+    <mc:Choice Requires="p159">
       <p:transition xmlns:p14="http://schemas.microsoft.com/office/powerpoint/2010/main" spd="slow" p14:dur="2000">
         <p159:morph option="byObject"/>
       </p:transition>
     </mc:Choice>
-    <mc:Fallback>
+    <mc:Fallback xmlns="">
       <p:transition spd="slow">
         <p:fade/>
       </p:transition>
@@ -18629,13 +18634,13 @@
   <p:clrMapOvr>
     <a:masterClrMapping/>
   </p:clrMapOvr>
-  <mc:AlternateContent xmlns:mc="http://schemas.openxmlformats.org/markup-compatibility/2006">
-    <mc:Choice xmlns:p159="http://schemas.microsoft.com/office/powerpoint/2015/09/main" Requires="p159">
+  <mc:AlternateContent xmlns:mc="http://schemas.openxmlformats.org/markup-compatibility/2006" xmlns:p159="http://schemas.microsoft.com/office/powerpoint/2015/09/main">
+    <mc:Choice Requires="p159">
       <p:transition xmlns:p14="http://schemas.microsoft.com/office/powerpoint/2010/main" spd="slow" p14:dur="2000">
         <p159:morph option="byObject"/>
       </p:transition>
     </mc:Choice>
-    <mc:Fallback>
+    <mc:Fallback xmlns="">
       <p:transition spd="slow">
         <p:fade/>
       </p:transition>
@@ -19549,13 +19554,13 @@
   <p:clrMapOvr>
     <a:masterClrMapping/>
   </p:clrMapOvr>
-  <mc:AlternateContent xmlns:mc="http://schemas.openxmlformats.org/markup-compatibility/2006">
-    <mc:Choice xmlns:p159="http://schemas.microsoft.com/office/powerpoint/2015/09/main" Requires="p159">
+  <mc:AlternateContent xmlns:mc="http://schemas.openxmlformats.org/markup-compatibility/2006" xmlns:p159="http://schemas.microsoft.com/office/powerpoint/2015/09/main">
+    <mc:Choice Requires="p159">
       <p:transition xmlns:p14="http://schemas.microsoft.com/office/powerpoint/2010/main" spd="slow" p14:dur="2000">
         <p159:morph option="byObject"/>
       </p:transition>
     </mc:Choice>
-    <mc:Fallback>
+    <mc:Fallback xmlns="">
       <p:transition spd="slow">
         <p:fade/>
       </p:transition>
@@ -20479,13 +20484,13 @@
   <p:clrMapOvr>
     <a:masterClrMapping/>
   </p:clrMapOvr>
-  <mc:AlternateContent xmlns:mc="http://schemas.openxmlformats.org/markup-compatibility/2006">
-    <mc:Choice xmlns:p159="http://schemas.microsoft.com/office/powerpoint/2015/09/main" Requires="p159">
+  <mc:AlternateContent xmlns:mc="http://schemas.openxmlformats.org/markup-compatibility/2006" xmlns:p159="http://schemas.microsoft.com/office/powerpoint/2015/09/main">
+    <mc:Choice Requires="p159">
       <p:transition xmlns:p14="http://schemas.microsoft.com/office/powerpoint/2010/main" spd="slow" p14:dur="2000">
         <p159:morph option="byObject"/>
       </p:transition>
     </mc:Choice>
-    <mc:Fallback>
+    <mc:Fallback xmlns="">
       <p:transition spd="slow">
         <p:fade/>
       </p:transition>

</xml_diff>